<commit_message>
Corrections to the presentation
Needs final revision
</commit_message>
<xml_diff>
--- a/presentation.pptx
+++ b/presentation.pptx
@@ -5,7 +5,7 @@
     <p:sldMasterId id="2147483689" r:id="rId1"/>
   </p:sldMasterIdLst>
   <p:notesMasterIdLst>
-    <p:notesMasterId r:id="rId20"/>
+    <p:notesMasterId r:id="rId21"/>
   </p:notesMasterIdLst>
   <p:sldIdLst>
     <p:sldId id="256" r:id="rId2"/>
@@ -25,7 +25,8 @@
     <p:sldId id="270" r:id="rId16"/>
     <p:sldId id="271" r:id="rId17"/>
     <p:sldId id="272" r:id="rId18"/>
-    <p:sldId id="273" r:id="rId19"/>
+    <p:sldId id="274" r:id="rId19"/>
+    <p:sldId id="273" r:id="rId20"/>
   </p:sldIdLst>
   <p:sldSz cx="12192000" cy="6858000"/>
   <p:notesSz cx="6858000" cy="9144000"/>
@@ -124,6 +125,11 @@
       </a:defRPr>
     </a:lvl9pPr>
   </p:defaultTextStyle>
+  <p:extLst>
+    <p:ext uri="{EFAFB233-063F-42B5-8137-9DF3F51BA10A}">
+      <p15:sldGuideLst xmlns:p15="http://schemas.microsoft.com/office/powerpoint/2012/main"/>
+    </p:ext>
+  </p:extLst>
 </p:presentation>
 </file>
 
@@ -10787,8 +10793,8 @@
           </a:p>
         </p:txBody>
       </p:sp>
-      <mc:AlternateContent xmlns:mc="http://schemas.openxmlformats.org/markup-compatibility/2006">
-        <mc:Choice xmlns:a14="http://schemas.microsoft.com/office/drawing/2010/main" Requires="a14">
+      <mc:AlternateContent xmlns:mc="http://schemas.openxmlformats.org/markup-compatibility/2006" xmlns:a14="http://schemas.microsoft.com/office/drawing/2010/main">
+        <mc:Choice Requires="a14">
           <p:sp>
             <p:nvSpPr>
               <p:cNvPr id="3" name="Content Placeholder 2">
@@ -11364,7 +11370,7 @@
             </p:txBody>
           </p:sp>
         </mc:Choice>
-        <mc:Fallback>
+        <mc:Fallback xmlns="">
           <p:sp>
             <p:nvSpPr>
               <p:cNvPr id="3" name="Content Placeholder 2">
@@ -13462,7 +13468,7 @@
         <p:spPr>
           <a:xfrm>
             <a:off x="6970881" y="2851102"/>
-            <a:ext cx="3868754" cy="830997"/>
+            <a:ext cx="3868754" cy="646331"/>
           </a:xfrm>
           <a:prstGeom prst="rect">
             <a:avLst/>
@@ -13483,55 +13489,8 @@
                 <a:effectLst/>
                 <a:latin typeface="Consolas" panose="020B0609020204030204" pitchFamily="49" charset="0"/>
               </a:rPr>
-              <a:t>Single value prediction:</a:t>
+              <a:t>Accuracy score: 0.9973582206918469 Predicted value: 0.9346523867785396 </a:t>
             </a:r>
-            <a:br>
-              <a:rPr lang="en-US" sz="1200" b="0" i="0" dirty="0">
-                <a:solidFill>
-                  <a:srgbClr val="3B3B3B"/>
-                </a:solidFill>
-                <a:effectLst/>
-                <a:latin typeface="Consolas" panose="020B0609020204030204" pitchFamily="49" charset="0"/>
-              </a:rPr>
-            </a:br>
-            <a:r>
-              <a:rPr lang="en-US" sz="1200" b="0" i="0" dirty="0">
-                <a:solidFill>
-                  <a:srgbClr val="3B3B3B"/>
-                </a:solidFill>
-                <a:effectLst/>
-                <a:latin typeface="Consolas" panose="020B0609020204030204" pitchFamily="49" charset="0"/>
-              </a:rPr>
-              <a:t>Accuracy score: 0.9999361599 </a:t>
-            </a:r>
-            <a:br>
-              <a:rPr lang="en-US" sz="1200" b="0" i="0" dirty="0">
-                <a:solidFill>
-                  <a:srgbClr val="3B3B3B"/>
-                </a:solidFill>
-                <a:effectLst/>
-                <a:latin typeface="Consolas" panose="020B0609020204030204" pitchFamily="49" charset="0"/>
-              </a:rPr>
-            </a:br>
-            <a:r>
-              <a:rPr lang="en-US" sz="1200" b="0" i="0" dirty="0">
-                <a:solidFill>
-                  <a:srgbClr val="3B3B3B"/>
-                </a:solidFill>
-                <a:effectLst/>
-                <a:latin typeface="Consolas" panose="020B0609020204030204" pitchFamily="49" charset="0"/>
-              </a:rPr>
-              <a:t>Predicted value: 0.05198999999999999 </a:t>
-            </a:r>
-            <a:br>
-              <a:rPr lang="en-US" sz="1200" b="0" i="0" dirty="0">
-                <a:solidFill>
-                  <a:srgbClr val="3B3B3B"/>
-                </a:solidFill>
-                <a:effectLst/>
-                <a:latin typeface="Consolas" panose="020B0609020204030204" pitchFamily="49" charset="0"/>
-              </a:rPr>
-            </a:br>
             <a:r>
               <a:rPr lang="en-US" sz="1200" b="0" i="0" dirty="0" err="1">
                 <a:solidFill>
@@ -13550,7 +13509,7 @@
                 <a:effectLst/>
                 <a:latin typeface="Consolas" panose="020B0609020204030204" pitchFamily="49" charset="0"/>
               </a:rPr>
-              <a:t> value: 0.044</a:t>
+              <a:t> value: 0.9860506290456943</a:t>
             </a:r>
             <a:endParaRPr lang="it-IT" sz="1200" dirty="0"/>
           </a:p>
@@ -13656,6 +13615,425 @@
           <p:cNvPr id="2" name="Title 1">
             <a:extLst>
               <a:ext uri="{FF2B5EF4-FFF2-40B4-BE49-F238E27FC236}">
+                <a16:creationId xmlns:a16="http://schemas.microsoft.com/office/drawing/2014/main" id="{C5CAFA9E-D06A-AABC-306F-53B2D4FAC85E}"/>
+              </a:ext>
+            </a:extLst>
+          </p:cNvPr>
+          <p:cNvSpPr>
+            <a:spLocks noGrp="1"/>
+          </p:cNvSpPr>
+          <p:nvPr>
+            <p:ph type="title"/>
+          </p:nvPr>
+        </p:nvSpPr>
+        <p:spPr/>
+        <p:txBody>
+          <a:bodyPr/>
+          <a:lstStyle/>
+          <a:p>
+            <a:r>
+              <a:rPr lang="it-IT" dirty="0">
+                <a:latin typeface="Bahnschrift" panose="020B0502040204020203" pitchFamily="34" charset="0"/>
+              </a:rPr>
+              <a:t>Comparing results</a:t>
+            </a:r>
+            <a:endParaRPr lang="it-IT" dirty="0"/>
+          </a:p>
+        </p:txBody>
+      </p:sp>
+      <p:graphicFrame>
+        <p:nvGraphicFramePr>
+          <p:cNvPr id="8" name="Table 8">
+            <a:extLst>
+              <a:ext uri="{FF2B5EF4-FFF2-40B4-BE49-F238E27FC236}">
+                <a16:creationId xmlns:a16="http://schemas.microsoft.com/office/drawing/2014/main" id="{B9D56BE5-6240-D726-001F-D7767CF1AE6D}"/>
+              </a:ext>
+            </a:extLst>
+          </p:cNvPr>
+          <p:cNvGraphicFramePr>
+            <a:graphicFrameLocks noGrp="1"/>
+          </p:cNvGraphicFramePr>
+          <p:nvPr>
+            <p:ph idx="1"/>
+            <p:extLst>
+              <p:ext uri="{D42A27DB-BD31-4B8C-83A1-F6EECF244321}">
+                <p14:modId xmlns:p14="http://schemas.microsoft.com/office/powerpoint/2010/main" val="3657076416"/>
+              </p:ext>
+            </p:extLst>
+          </p:nvPr>
+        </p:nvGraphicFramePr>
+        <p:xfrm>
+          <a:off x="1154083" y="2767219"/>
+          <a:ext cx="10058400" cy="1483360"/>
+        </p:xfrm>
+        <a:graphic>
+          <a:graphicData uri="http://schemas.openxmlformats.org/drawingml/2006/table">
+            <a:tbl>
+              <a:tblPr firstRow="1" bandRow="1">
+                <a:tableStyleId>{5C22544A-7EE6-4342-B048-85BDC9FD1C3A}</a:tableStyleId>
+              </a:tblPr>
+              <a:tblGrid>
+                <a:gridCol w="2514600">
+                  <a:extLst>
+                    <a:ext uri="{9D8B030D-6E8A-4147-A177-3AD203B41FA5}">
+                      <a16:colId xmlns:a16="http://schemas.microsoft.com/office/drawing/2014/main" val="1812093762"/>
+                    </a:ext>
+                  </a:extLst>
+                </a:gridCol>
+                <a:gridCol w="2514600">
+                  <a:extLst>
+                    <a:ext uri="{9D8B030D-6E8A-4147-A177-3AD203B41FA5}">
+                      <a16:colId xmlns:a16="http://schemas.microsoft.com/office/drawing/2014/main" val="3600835382"/>
+                    </a:ext>
+                  </a:extLst>
+                </a:gridCol>
+                <a:gridCol w="2514600">
+                  <a:extLst>
+                    <a:ext uri="{9D8B030D-6E8A-4147-A177-3AD203B41FA5}">
+                      <a16:colId xmlns:a16="http://schemas.microsoft.com/office/drawing/2014/main" val="2501030838"/>
+                    </a:ext>
+                  </a:extLst>
+                </a:gridCol>
+                <a:gridCol w="2514600">
+                  <a:extLst>
+                    <a:ext uri="{9D8B030D-6E8A-4147-A177-3AD203B41FA5}">
+                      <a16:colId xmlns:a16="http://schemas.microsoft.com/office/drawing/2014/main" val="3554834528"/>
+                    </a:ext>
+                  </a:extLst>
+                </a:gridCol>
+              </a:tblGrid>
+              <a:tr h="370840">
+                <a:tc>
+                  <a:txBody>
+                    <a:bodyPr/>
+                    <a:lstStyle/>
+                    <a:p>
+                      <a:r>
+                        <a:rPr lang="it-IT" dirty="0"/>
+                        <a:t>Model</a:t>
+                      </a:r>
+                    </a:p>
+                  </a:txBody>
+                  <a:tcPr/>
+                </a:tc>
+                <a:tc>
+                  <a:txBody>
+                    <a:bodyPr/>
+                    <a:lstStyle/>
+                    <a:p>
+                      <a:r>
+                        <a:rPr lang="it-IT" dirty="0"/>
+                        <a:t>Observed value</a:t>
+                      </a:r>
+                    </a:p>
+                  </a:txBody>
+                  <a:tcPr/>
+                </a:tc>
+                <a:tc>
+                  <a:txBody>
+                    <a:bodyPr/>
+                    <a:lstStyle/>
+                    <a:p>
+                      <a:r>
+                        <a:rPr lang="it-IT" dirty="0"/>
+                        <a:t>Predicted value</a:t>
+                      </a:r>
+                    </a:p>
+                  </a:txBody>
+                  <a:tcPr/>
+                </a:tc>
+                <a:tc>
+                  <a:txBody>
+                    <a:bodyPr/>
+                    <a:lstStyle/>
+                    <a:p>
+                      <a:r>
+                        <a:rPr lang="it-IT" dirty="0"/>
+                        <a:t>Accuracy (1 - SE)</a:t>
+                      </a:r>
+                    </a:p>
+                  </a:txBody>
+                  <a:tcPr/>
+                </a:tc>
+                <a:extLst>
+                  <a:ext uri="{0D108BD9-81ED-4DB2-BD59-A6C34878D82A}">
+                    <a16:rowId xmlns:a16="http://schemas.microsoft.com/office/drawing/2014/main" val="2166784019"/>
+                  </a:ext>
+                </a:extLst>
+              </a:tr>
+              <a:tr h="370840">
+                <a:tc>
+                  <a:txBody>
+                    <a:bodyPr/>
+                    <a:lstStyle/>
+                    <a:p>
+                      <a:r>
+                        <a:rPr lang="it-IT" dirty="0"/>
+                        <a:t>Standard pricing</a:t>
+                      </a:r>
+                    </a:p>
+                  </a:txBody>
+                  <a:tcPr/>
+                </a:tc>
+                <a:tc>
+                  <a:txBody>
+                    <a:bodyPr/>
+                    <a:lstStyle/>
+                    <a:p>
+                      <a:r>
+                        <a:rPr lang="it-IT" dirty="0"/>
+                        <a:t>0.93</a:t>
+                      </a:r>
+                    </a:p>
+                  </a:txBody>
+                  <a:tcPr/>
+                </a:tc>
+                <a:tc>
+                  <a:txBody>
+                    <a:bodyPr/>
+                    <a:lstStyle/>
+                    <a:p>
+                      <a:r>
+                        <a:rPr lang="it-IT" dirty="0"/>
+                        <a:t>0.98</a:t>
+                      </a:r>
+                    </a:p>
+                  </a:txBody>
+                  <a:tcPr/>
+                </a:tc>
+                <a:tc>
+                  <a:txBody>
+                    <a:bodyPr/>
+                    <a:lstStyle/>
+                    <a:p>
+                      <a:r>
+                        <a:rPr lang="it-IT" dirty="0"/>
+                        <a:t>0.99</a:t>
+                      </a:r>
+                    </a:p>
+                  </a:txBody>
+                  <a:tcPr/>
+                </a:tc>
+                <a:extLst>
+                  <a:ext uri="{0D108BD9-81ED-4DB2-BD59-A6C34878D82A}">
+                    <a16:rowId xmlns:a16="http://schemas.microsoft.com/office/drawing/2014/main" val="1897951549"/>
+                  </a:ext>
+                </a:extLst>
+              </a:tr>
+              <a:tr h="370840">
+                <a:tc>
+                  <a:txBody>
+                    <a:bodyPr/>
+                    <a:lstStyle/>
+                    <a:p>
+                      <a:r>
+                        <a:rPr lang="it-IT" dirty="0"/>
+                        <a:t>Using returns</a:t>
+                      </a:r>
+                    </a:p>
+                  </a:txBody>
+                  <a:tcPr/>
+                </a:tc>
+                <a:tc>
+                  <a:txBody>
+                    <a:bodyPr/>
+                    <a:lstStyle/>
+                    <a:p>
+                      <a:r>
+                        <a:rPr lang="it-IT" dirty="0"/>
+                        <a:t>0.052</a:t>
+                      </a:r>
+                    </a:p>
+                  </a:txBody>
+                  <a:tcPr/>
+                </a:tc>
+                <a:tc>
+                  <a:txBody>
+                    <a:bodyPr/>
+                    <a:lstStyle/>
+                    <a:p>
+                      <a:r>
+                        <a:rPr lang="it-IT" dirty="0"/>
+                        <a:t>0.044</a:t>
+                      </a:r>
+                    </a:p>
+                  </a:txBody>
+                  <a:tcPr/>
+                </a:tc>
+                <a:tc>
+                  <a:txBody>
+                    <a:bodyPr/>
+                    <a:lstStyle/>
+                    <a:p>
+                      <a:r>
+                        <a:rPr lang="it-IT" dirty="0"/>
+                        <a:t>0.99</a:t>
+                      </a:r>
+                    </a:p>
+                  </a:txBody>
+                  <a:tcPr/>
+                </a:tc>
+                <a:extLst>
+                  <a:ext uri="{0D108BD9-81ED-4DB2-BD59-A6C34878D82A}">
+                    <a16:rowId xmlns:a16="http://schemas.microsoft.com/office/drawing/2014/main" val="1705763528"/>
+                  </a:ext>
+                </a:extLst>
+              </a:tr>
+              <a:tr h="370840">
+                <a:tc>
+                  <a:txBody>
+                    <a:bodyPr/>
+                    <a:lstStyle/>
+                    <a:p>
+                      <a:r>
+                        <a:rPr lang="it-IT" dirty="0"/>
+                        <a:t>Final model</a:t>
+                      </a:r>
+                    </a:p>
+                  </a:txBody>
+                  <a:tcPr/>
+                </a:tc>
+                <a:tc>
+                  <a:txBody>
+                    <a:bodyPr/>
+                    <a:lstStyle/>
+                    <a:p>
+                      <a:r>
+                        <a:rPr lang="it-IT" dirty="0"/>
+                        <a:t>0.93</a:t>
+                      </a:r>
+                    </a:p>
+                  </a:txBody>
+                  <a:tcPr/>
+                </a:tc>
+                <a:tc>
+                  <a:txBody>
+                    <a:bodyPr/>
+                    <a:lstStyle/>
+                    <a:p>
+                      <a:r>
+                        <a:rPr lang="it-IT" dirty="0"/>
+                        <a:t>0.98</a:t>
+                      </a:r>
+                    </a:p>
+                  </a:txBody>
+                  <a:tcPr/>
+                </a:tc>
+                <a:tc>
+                  <a:txBody>
+                    <a:bodyPr/>
+                    <a:lstStyle/>
+                    <a:p>
+                      <a:r>
+                        <a:rPr lang="it-IT" dirty="0"/>
+                        <a:t>0.99</a:t>
+                      </a:r>
+                    </a:p>
+                  </a:txBody>
+                  <a:tcPr/>
+                </a:tc>
+                <a:extLst>
+                  <a:ext uri="{0D108BD9-81ED-4DB2-BD59-A6C34878D82A}">
+                    <a16:rowId xmlns:a16="http://schemas.microsoft.com/office/drawing/2014/main" val="1680439782"/>
+                  </a:ext>
+                </a:extLst>
+              </a:tr>
+            </a:tbl>
+          </a:graphicData>
+        </a:graphic>
+      </p:graphicFrame>
+      <p:sp>
+        <p:nvSpPr>
+          <p:cNvPr id="4" name="Footer Placeholder 3">
+            <a:extLst>
+              <a:ext uri="{FF2B5EF4-FFF2-40B4-BE49-F238E27FC236}">
+                <a16:creationId xmlns:a16="http://schemas.microsoft.com/office/drawing/2014/main" id="{E5EE910B-968B-F080-CA35-B6A050E3D585}"/>
+              </a:ext>
+            </a:extLst>
+          </p:cNvPr>
+          <p:cNvSpPr>
+            <a:spLocks noGrp="1"/>
+          </p:cNvSpPr>
+          <p:nvPr>
+            <p:ph type="ftr" sz="quarter" idx="11"/>
+          </p:nvPr>
+        </p:nvSpPr>
+        <p:spPr/>
+        <p:txBody>
+          <a:bodyPr/>
+          <a:lstStyle/>
+          <a:p>
+            <a:r>
+              <a:rPr lang="it-IT"/>
+              <a:t>matteo.minardi@unitn.it</a:t>
+            </a:r>
+          </a:p>
+        </p:txBody>
+      </p:sp>
+      <p:sp>
+        <p:nvSpPr>
+          <p:cNvPr id="5" name="Slide Number Placeholder 4">
+            <a:extLst>
+              <a:ext uri="{FF2B5EF4-FFF2-40B4-BE49-F238E27FC236}">
+                <a16:creationId xmlns:a16="http://schemas.microsoft.com/office/drawing/2014/main" id="{EA0DB7A6-87F3-9A35-FB4F-00B8F3676154}"/>
+              </a:ext>
+            </a:extLst>
+          </p:cNvPr>
+          <p:cNvSpPr>
+            <a:spLocks noGrp="1"/>
+          </p:cNvSpPr>
+          <p:nvPr>
+            <p:ph type="sldNum" sz="quarter" idx="12"/>
+          </p:nvPr>
+        </p:nvSpPr>
+        <p:spPr/>
+        <p:txBody>
+          <a:bodyPr/>
+          <a:lstStyle/>
+          <a:p>
+            <a:fld id="{700A0B3D-1A33-4DE6-901D-7EA6338CCE01}" type="slidenum">
+              <a:rPr lang="it-IT" smtClean="0"/>
+              <a:t>18</a:t>
+            </a:fld>
+            <a:endParaRPr lang="it-IT"/>
+          </a:p>
+        </p:txBody>
+      </p:sp>
+    </p:spTree>
+    <p:extLst>
+      <p:ext uri="{BB962C8B-B14F-4D97-AF65-F5344CB8AC3E}">
+        <p14:creationId xmlns:p14="http://schemas.microsoft.com/office/powerpoint/2010/main" val="3617737068"/>
+      </p:ext>
+    </p:extLst>
+  </p:cSld>
+  <p:clrMapOvr>
+    <a:masterClrMapping/>
+  </p:clrMapOvr>
+</p:sld>
+</file>
+
+<file path=ppt/slides/slide19.xml><?xml version="1.0" encoding="utf-8"?>
+<p:sld xmlns:a="http://schemas.openxmlformats.org/drawingml/2006/main" xmlns:r="http://schemas.openxmlformats.org/officeDocument/2006/relationships" xmlns:p="http://schemas.openxmlformats.org/presentationml/2006/main">
+  <p:cSld>
+    <p:spTree>
+      <p:nvGrpSpPr>
+        <p:cNvPr id="1" name=""/>
+        <p:cNvGrpSpPr/>
+        <p:nvPr/>
+      </p:nvGrpSpPr>
+      <p:grpSpPr>
+        <a:xfrm>
+          <a:off x="0" y="0"/>
+          <a:ext cx="0" cy="0"/>
+          <a:chOff x="0" y="0"/>
+          <a:chExt cx="0" cy="0"/>
+        </a:xfrm>
+      </p:grpSpPr>
+      <p:sp>
+        <p:nvSpPr>
+          <p:cNvPr id="2" name="Title 1">
+            <a:extLst>
+              <a:ext uri="{FF2B5EF4-FFF2-40B4-BE49-F238E27FC236}">
                 <a16:creationId xmlns:a16="http://schemas.microsoft.com/office/drawing/2014/main" id="{E917C25C-8818-6751-767E-FD93AB5482B5}"/>
               </a:ext>
             </a:extLst>
@@ -13748,27 +14126,7 @@
                 <a:effectLst/>
                 <a:latin typeface="Bahnschrift" panose="020B0502040204020203" pitchFamily="34" charset="0"/>
               </a:rPr>
-              <a:t> </a:t>
-            </a:r>
-            <a:r>
-              <a:rPr lang="en-US" b="0" dirty="0" err="1">
-                <a:solidFill>
-                  <a:srgbClr val="3B3B3B"/>
-                </a:solidFill>
-                <a:effectLst/>
-                <a:latin typeface="Bahnschrift" panose="020B0502040204020203" pitchFamily="34" charset="0"/>
-              </a:rPr>
-              <a:t>behaviour</a:t>
-            </a:r>
-            <a:r>
-              <a:rPr lang="en-US" b="0" dirty="0">
-                <a:solidFill>
-                  <a:srgbClr val="3B3B3B"/>
-                </a:solidFill>
-                <a:effectLst/>
-                <a:latin typeface="Bahnschrift" panose="020B0502040204020203" pitchFamily="34" charset="0"/>
-              </a:rPr>
-              <a:t> of the market.</a:t>
+              <a:t> behavior of the market.</a:t>
             </a:r>
           </a:p>
           <a:p>
@@ -13829,7 +14187,7 @@
           <a:p>
             <a:fld id="{700A0B3D-1A33-4DE6-901D-7EA6338CCE01}" type="slidenum">
               <a:rPr lang="it-IT" smtClean="0"/>
-              <a:t>18</a:t>
+              <a:t>19</a:t>
             </a:fld>
             <a:endParaRPr lang="it-IT"/>
           </a:p>
@@ -15433,8 +15791,8 @@
           </a:p>
         </p:txBody>
       </p:sp>
-      <mc:AlternateContent xmlns:mc="http://schemas.openxmlformats.org/markup-compatibility/2006">
-        <mc:Choice xmlns:a14="http://schemas.microsoft.com/office/drawing/2010/main" Requires="a14">
+      <mc:AlternateContent xmlns:mc="http://schemas.openxmlformats.org/markup-compatibility/2006" xmlns:a14="http://schemas.microsoft.com/office/drawing/2010/main">
+        <mc:Choice Requires="a14">
           <p:sp>
             <p:nvSpPr>
               <p:cNvPr id="3" name="Content Placeholder 2">
@@ -15464,7 +15822,6 @@
                 </a:r>
               </a:p>
               <a:p>
-                <a:pPr/>
                 <a14:m>
                   <m:oMath xmlns:m="http://schemas.openxmlformats.org/officeDocument/2006/math">
                     <m:sSub>
@@ -15728,7 +16085,6 @@
                 </a:endParaRPr>
               </a:p>
               <a:p>
-                <a:pPr/>
                 <a14:m>
                   <m:oMath xmlns:m="http://schemas.openxmlformats.org/officeDocument/2006/math">
                     <m:sSub>
@@ -15992,7 +16348,6 @@
                 </a:endParaRPr>
               </a:p>
               <a:p>
-                <a:pPr/>
                 <a14:m>
                   <m:oMath xmlns:m="http://schemas.openxmlformats.org/officeDocument/2006/math">
                     <m:sSub>
@@ -16530,7 +16885,7 @@
             </p:txBody>
           </p:sp>
         </mc:Choice>
-        <mc:Fallback>
+        <mc:Fallback xmlns="">
           <p:sp>
             <p:nvSpPr>
               <p:cNvPr id="3" name="Content Placeholder 2">
@@ -16908,8 +17263,8 @@
           </a:p>
         </p:txBody>
       </p:sp>
-      <mc:AlternateContent xmlns:mc="http://schemas.openxmlformats.org/markup-compatibility/2006">
-        <mc:Choice xmlns:a14="http://schemas.microsoft.com/office/drawing/2010/main" Requires="a14">
+      <mc:AlternateContent xmlns:mc="http://schemas.openxmlformats.org/markup-compatibility/2006" xmlns:a14="http://schemas.microsoft.com/office/drawing/2010/main">
+        <mc:Choice Requires="a14">
           <p:sp>
             <p:nvSpPr>
               <p:cNvPr id="3" name="Content Placeholder 2">
@@ -16938,7 +17293,6 @@
               </a:bodyPr>
               <a:lstStyle/>
               <a:p>
-                <a:pPr/>
                 <a14:m>
                   <m:oMath xmlns:m="http://schemas.openxmlformats.org/officeDocument/2006/math">
                     <m:sSub>
@@ -17223,7 +17577,7 @@
             </p:txBody>
           </p:sp>
         </mc:Choice>
-        <mc:Fallback>
+        <mc:Fallback xmlns="">
           <p:sp>
             <p:nvSpPr>
               <p:cNvPr id="3" name="Content Placeholder 2">

</xml_diff>